<commit_message>
some poster stuff, minor saird tweaking
</commit_message>
<xml_diff>
--- a/Posters/Using Feedback and Vaccination Data to More Accurately Model and Predict the SARS-CoV-2 Pandemic.pptx
+++ b/Posters/Using Feedback and Vaccination Data to More Accurately Model and Predict the SARS-CoV-2 Pandemic.pptx
@@ -243,7 +243,7 @@
           <a:p>
             <a:fld id="{62BE2B66-B343-4A6F-9896-6FFEB2086BBB}" type="datetimeFigureOut">
               <a:rPr lang="en-US" smtClean="0"/>
-              <a:t>6/29/2021</a:t>
+              <a:t>6/30/2021</a:t>
             </a:fld>
             <a:endParaRPr lang="en-US"/>
           </a:p>
@@ -413,7 +413,7 @@
           <a:p>
             <a:fld id="{62BE2B66-B343-4A6F-9896-6FFEB2086BBB}" type="datetimeFigureOut">
               <a:rPr lang="en-US" smtClean="0"/>
-              <a:t>6/29/2021</a:t>
+              <a:t>6/30/2021</a:t>
             </a:fld>
             <a:endParaRPr lang="en-US"/>
           </a:p>
@@ -593,7 +593,7 @@
           <a:p>
             <a:fld id="{62BE2B66-B343-4A6F-9896-6FFEB2086BBB}" type="datetimeFigureOut">
               <a:rPr lang="en-US" smtClean="0"/>
-              <a:t>6/29/2021</a:t>
+              <a:t>6/30/2021</a:t>
             </a:fld>
             <a:endParaRPr lang="en-US"/>
           </a:p>
@@ -763,7 +763,7 @@
           <a:p>
             <a:fld id="{62BE2B66-B343-4A6F-9896-6FFEB2086BBB}" type="datetimeFigureOut">
               <a:rPr lang="en-US" smtClean="0"/>
-              <a:t>6/29/2021</a:t>
+              <a:t>6/30/2021</a:t>
             </a:fld>
             <a:endParaRPr lang="en-US"/>
           </a:p>
@@ -1007,7 +1007,7 @@
           <a:p>
             <a:fld id="{62BE2B66-B343-4A6F-9896-6FFEB2086BBB}" type="datetimeFigureOut">
               <a:rPr lang="en-US" smtClean="0"/>
-              <a:t>6/29/2021</a:t>
+              <a:t>6/30/2021</a:t>
             </a:fld>
             <a:endParaRPr lang="en-US"/>
           </a:p>
@@ -1239,7 +1239,7 @@
           <a:p>
             <a:fld id="{62BE2B66-B343-4A6F-9896-6FFEB2086BBB}" type="datetimeFigureOut">
               <a:rPr lang="en-US" smtClean="0"/>
-              <a:t>6/29/2021</a:t>
+              <a:t>6/30/2021</a:t>
             </a:fld>
             <a:endParaRPr lang="en-US"/>
           </a:p>
@@ -1606,7 +1606,7 @@
           <a:p>
             <a:fld id="{62BE2B66-B343-4A6F-9896-6FFEB2086BBB}" type="datetimeFigureOut">
               <a:rPr lang="en-US" smtClean="0"/>
-              <a:t>6/29/2021</a:t>
+              <a:t>6/30/2021</a:t>
             </a:fld>
             <a:endParaRPr lang="en-US"/>
           </a:p>
@@ -1724,7 +1724,7 @@
           <a:p>
             <a:fld id="{62BE2B66-B343-4A6F-9896-6FFEB2086BBB}" type="datetimeFigureOut">
               <a:rPr lang="en-US" smtClean="0"/>
-              <a:t>6/29/2021</a:t>
+              <a:t>6/30/2021</a:t>
             </a:fld>
             <a:endParaRPr lang="en-US"/>
           </a:p>
@@ -1819,7 +1819,7 @@
           <a:p>
             <a:fld id="{62BE2B66-B343-4A6F-9896-6FFEB2086BBB}" type="datetimeFigureOut">
               <a:rPr lang="en-US" smtClean="0"/>
-              <a:t>6/29/2021</a:t>
+              <a:t>6/30/2021</a:t>
             </a:fld>
             <a:endParaRPr lang="en-US"/>
           </a:p>
@@ -2096,7 +2096,7 @@
           <a:p>
             <a:fld id="{62BE2B66-B343-4A6F-9896-6FFEB2086BBB}" type="datetimeFigureOut">
               <a:rPr lang="en-US" smtClean="0"/>
-              <a:t>6/29/2021</a:t>
+              <a:t>6/30/2021</a:t>
             </a:fld>
             <a:endParaRPr lang="en-US"/>
           </a:p>
@@ -2353,7 +2353,7 @@
           <a:p>
             <a:fld id="{62BE2B66-B343-4A6F-9896-6FFEB2086BBB}" type="datetimeFigureOut">
               <a:rPr lang="en-US" smtClean="0"/>
-              <a:t>6/29/2021</a:t>
+              <a:t>6/30/2021</a:t>
             </a:fld>
             <a:endParaRPr lang="en-US"/>
           </a:p>
@@ -2566,7 +2566,7 @@
           <a:p>
             <a:fld id="{62BE2B66-B343-4A6F-9896-6FFEB2086BBB}" type="datetimeFigureOut">
               <a:rPr lang="en-US" smtClean="0"/>
-              <a:t>6/29/2021</a:t>
+              <a:t>6/30/2021</a:t>
             </a:fld>
             <a:endParaRPr lang="en-US"/>
           </a:p>
@@ -3180,8 +3180,8 @@
         </p:nvSpPr>
         <p:spPr>
           <a:xfrm>
-            <a:off x="266703" y="3842172"/>
-            <a:ext cx="12434366" cy="12369540"/>
+            <a:off x="266694" y="3734945"/>
+            <a:ext cx="12434366" cy="6940361"/>
           </a:xfrm>
           <a:prstGeom prst="rect">
             <a:avLst/>
@@ -3205,33 +3205,6 @@
               <a:rPr lang="en-US" sz="4000" dirty="0"/>
               <a:t>We compare the predictive power of several different disease models and their ability to model the transmission, recovery and death rates. The simplest disease model tracks the susceptible, infected, recovered, and dead populations over time (SIRD). We additionally use a model incorporating asymptomatic individuals (SAIRD) and add a degree of feedback to these models to better track the transmission rate. The inclusion of feedback enables the model to predict minor outbreak spikes, which is a major advantage over the basic SIRD model.</a:t>
             </a:r>
-          </a:p>
-          <a:p>
-            <a:endParaRPr lang="en-US" sz="5040" dirty="0"/>
-          </a:p>
-          <a:p>
-            <a:pPr algn="ctr"/>
-            <a:endParaRPr lang="en-US" sz="5040" dirty="0"/>
-          </a:p>
-          <a:p>
-            <a:pPr algn="ctr"/>
-            <a:endParaRPr lang="en-US" sz="5040" u="sng" dirty="0"/>
-          </a:p>
-          <a:p>
-            <a:pPr algn="ctr"/>
-            <a:endParaRPr lang="en-US" sz="5040" u="sng" dirty="0"/>
-          </a:p>
-          <a:p>
-            <a:pPr algn="ctr"/>
-            <a:endParaRPr lang="en-US" sz="5040" u="sng" dirty="0"/>
-          </a:p>
-          <a:p>
-            <a:pPr algn="ctr"/>
-            <a:endParaRPr lang="en-US" sz="5040" u="sng" dirty="0"/>
-          </a:p>
-          <a:p>
-            <a:pPr algn="ctr"/>
-            <a:endParaRPr lang="en-US" sz="5040" u="sng" dirty="0"/>
           </a:p>
         </p:txBody>
       </p:sp>
@@ -3249,7 +3222,7 @@
         </p:nvSpPr>
         <p:spPr>
           <a:xfrm>
-            <a:off x="465545" y="15573929"/>
+            <a:off x="465543" y="15357618"/>
             <a:ext cx="11885949" cy="8787021"/>
           </a:xfrm>
           <a:prstGeom prst="rect">
@@ -3344,7 +3317,7 @@
         </p:nvSpPr>
         <p:spPr>
           <a:xfrm>
-            <a:off x="266694" y="10848711"/>
+            <a:off x="266694" y="10675306"/>
             <a:ext cx="12283652" cy="4478149"/>
           </a:xfrm>
           <a:prstGeom prst="rect">
@@ -3386,8 +3359,8 @@
         </p:nvSpPr>
         <p:spPr>
           <a:xfrm>
-            <a:off x="25286982" y="8165966"/>
-            <a:ext cx="19539637" cy="867930"/>
+            <a:off x="25066160" y="3753950"/>
+            <a:ext cx="18558346" cy="10018127"/>
           </a:xfrm>
           <a:prstGeom prst="rect">
             <a:avLst/>
@@ -3402,15 +3375,66 @@
           <a:p>
             <a:pPr algn="ctr"/>
             <a:r>
-              <a:rPr lang="en-US" sz="5040" b="1" dirty="0">
-                <a:solidFill>
-                  <a:schemeClr val="accent1">
-                    <a:lumMod val="75000"/>
-                  </a:schemeClr>
-                </a:solidFill>
-              </a:rPr>
+              <a:rPr lang="en-US" sz="4500" b="1" dirty="0"/>
               <a:t>Results</a:t>
             </a:r>
+          </a:p>
+          <a:p>
+            <a:r>
+              <a:rPr lang="en-US" sz="4000" dirty="0"/>
+              <a:t>Modeling Transmission Rate in Italy and California:</a:t>
+            </a:r>
+          </a:p>
+          <a:p>
+            <a:endParaRPr lang="en-US" sz="4000" dirty="0"/>
+          </a:p>
+          <a:p>
+            <a:endParaRPr lang="en-US" sz="4000" dirty="0"/>
+          </a:p>
+          <a:p>
+            <a:endParaRPr lang="en-US" sz="4000" dirty="0"/>
+          </a:p>
+          <a:p>
+            <a:r>
+              <a:rPr lang="en-US" sz="4000" dirty="0"/>
+              <a:t>Predicting first wave decline:</a:t>
+            </a:r>
+          </a:p>
+          <a:p>
+            <a:endParaRPr lang="en-US" sz="4000" dirty="0"/>
+          </a:p>
+          <a:p>
+            <a:endParaRPr lang="en-US" sz="4000" dirty="0"/>
+          </a:p>
+          <a:p>
+            <a:r>
+              <a:rPr lang="en-US" sz="4000" dirty="0"/>
+              <a:t>Predicting first wave:</a:t>
+            </a:r>
+          </a:p>
+          <a:p>
+            <a:endParaRPr lang="en-US" sz="4000" dirty="0"/>
+          </a:p>
+          <a:p>
+            <a:endParaRPr lang="en-US" sz="4000" dirty="0"/>
+          </a:p>
+          <a:p>
+            <a:r>
+              <a:rPr lang="en-US" sz="4000" dirty="0"/>
+              <a:t>Predicting late-stage wave:</a:t>
+            </a:r>
+          </a:p>
+          <a:p>
+            <a:endParaRPr lang="en-US" sz="4000" dirty="0"/>
+          </a:p>
+          <a:p>
+            <a:endParaRPr lang="en-US" sz="4000" dirty="0"/>
+          </a:p>
+          <a:p>
+            <a:endParaRPr lang="en-US" sz="4000" dirty="0"/>
+          </a:p>
+          <a:p>
+            <a:endParaRPr lang="en-US" sz="4000" dirty="0"/>
           </a:p>
         </p:txBody>
       </p:sp>
@@ -3428,8 +3452,8 @@
         </p:nvSpPr>
         <p:spPr>
           <a:xfrm>
-            <a:off x="13499568" y="21729460"/>
-            <a:ext cx="20370557" cy="867930"/>
+            <a:off x="13029502" y="21729460"/>
+            <a:ext cx="20840624" cy="784830"/>
           </a:xfrm>
           <a:prstGeom prst="rect">
             <a:avLst/>
@@ -3444,13 +3468,7 @@
           <a:p>
             <a:pPr algn="ctr"/>
             <a:r>
-              <a:rPr lang="en-US" sz="5040" b="1" dirty="0">
-                <a:solidFill>
-                  <a:schemeClr val="accent1">
-                    <a:lumMod val="75000"/>
-                  </a:schemeClr>
-                </a:solidFill>
-              </a:rPr>
+              <a:rPr lang="en-US" sz="4500" b="1" dirty="0"/>
               <a:t>Conclusion</a:t>
             </a:r>
           </a:p>
@@ -3471,7 +3489,7 @@
         <p:spPr>
           <a:xfrm>
             <a:off x="35243827" y="21729469"/>
-            <a:ext cx="7912490" cy="867930"/>
+            <a:ext cx="7912490" cy="784830"/>
           </a:xfrm>
           <a:prstGeom prst="rect">
             <a:avLst/>
@@ -3486,14 +3504,171 @@
           <a:p>
             <a:pPr algn="ctr"/>
             <a:r>
-              <a:rPr lang="en-US" sz="5040" b="1" dirty="0">
-                <a:solidFill>
-                  <a:schemeClr val="accent1">
-                    <a:lumMod val="75000"/>
-                  </a:schemeClr>
-                </a:solidFill>
+              <a:rPr lang="en-US" sz="4500" b="1" dirty="0"/>
+              <a:t>References</a:t>
+            </a:r>
+          </a:p>
+        </p:txBody>
+      </p:sp>
+      <p:sp>
+        <p:nvSpPr>
+          <p:cNvPr id="18" name="TextBox 17">
+            <a:extLst>
+              <a:ext uri="{FF2B5EF4-FFF2-40B4-BE49-F238E27FC236}">
+                <a16:creationId xmlns:a16="http://schemas.microsoft.com/office/drawing/2014/main" id="{FE17A449-293F-4E77-9C85-626392C3C7BF}"/>
+              </a:ext>
+            </a:extLst>
+          </p:cNvPr>
+          <p:cNvSpPr txBox="1"/>
+          <p:nvPr/>
+        </p:nvSpPr>
+        <p:spPr>
+          <a:xfrm>
+            <a:off x="12922373" y="3559125"/>
+            <a:ext cx="12049676" cy="16173658"/>
+          </a:xfrm>
+          <a:prstGeom prst="rect">
+            <a:avLst/>
+          </a:prstGeom>
+          <a:noFill/>
+        </p:spPr>
+        <p:txBody>
+          <a:bodyPr wrap="square">
+            <a:spAutoFit/>
+          </a:bodyPr>
+          <a:lstStyle/>
+          <a:p>
+            <a:pPr algn="ctr"/>
+            <a:r>
+              <a:rPr lang="en-US" sz="4500" b="1" dirty="0"/>
+              <a:t>Models</a:t>
+            </a:r>
+          </a:p>
+          <a:p>
+            <a:r>
+              <a:rPr lang="en-US" sz="4000" b="1" dirty="0"/>
+              <a:t>SIRD:</a:t>
+            </a:r>
+          </a:p>
+          <a:p>
+            <a:r>
+              <a:rPr lang="en-US" sz="4000" dirty="0"/>
+              <a:t>The SIRD model </a:t>
+            </a:r>
+          </a:p>
+          <a:p>
+            <a:r>
+              <a:rPr lang="en-US" sz="4000" dirty="0"/>
+              <a:t>--</a:t>
+            </a:r>
+          </a:p>
+          <a:p>
+            <a:r>
+              <a:rPr lang="en-US" sz="4000" dirty="0"/>
+              <a:t> </a:t>
+            </a:r>
+          </a:p>
+          <a:p>
+            <a:endParaRPr lang="en-US" sz="4000" dirty="0"/>
+          </a:p>
+          <a:p>
+            <a:endParaRPr lang="en-US" sz="4000" dirty="0"/>
+          </a:p>
+          <a:p>
+            <a:r>
+              <a:rPr lang="en-US" sz="4000" b="1" dirty="0"/>
+              <a:t>SAIRD:</a:t>
+            </a:r>
+          </a:p>
+          <a:p>
+            <a:endParaRPr lang="en-US" sz="4000" dirty="0"/>
+          </a:p>
+          <a:p>
+            <a:endParaRPr lang="en-US" sz="4000" dirty="0"/>
+          </a:p>
+          <a:p>
+            <a:endParaRPr lang="en-US" sz="4000" dirty="0"/>
+          </a:p>
+          <a:p>
+            <a:r>
+              <a:rPr lang="en-US" sz="4000" b="1" dirty="0"/>
+              <a:t>SIRD+V:</a:t>
+            </a:r>
+          </a:p>
+          <a:p>
+            <a:endParaRPr lang="en-US" sz="4000" dirty="0"/>
+          </a:p>
+          <a:p>
+            <a:endParaRPr lang="en-US" sz="4000" dirty="0"/>
+          </a:p>
+          <a:p>
+            <a:endParaRPr lang="en-US" sz="4000" dirty="0"/>
+          </a:p>
+          <a:p>
+            <a:r>
+              <a:rPr lang="en-US" sz="4000" b="1" dirty="0"/>
+              <a:t>Feedback SIRD:</a:t>
+            </a:r>
+          </a:p>
+          <a:p>
+            <a:r>
+              <a:rPr lang="en-US" sz="4000" dirty="0"/>
+              <a:t>This model is identical to the SIRD model except for the transmission rate parameter, </a:t>
+            </a:r>
+            <a:r>
+              <a:rPr lang="el-GR" sz="4000" i="1" dirty="0">
+                <a:latin typeface="Cambria Math" panose="02040503050406030204" pitchFamily="18" charset="0"/>
+                <a:ea typeface="Cambria Math" panose="02040503050406030204" pitchFamily="18" charset="0"/>
               </a:rPr>
-              <a:t>References</a:t>
+              <a:t>β</a:t>
+            </a:r>
+            <a:r>
+              <a:rPr lang="en-US" sz="4000" dirty="0"/>
+              <a:t>. Beta is replaced with a time varying function depending on the current infections with a shift, </a:t>
+            </a:r>
+            <a:r>
+              <a:rPr lang="en-US" sz="4000" i="1" dirty="0"/>
+              <a:t>s </a:t>
+            </a:r>
+            <a:r>
+              <a:rPr lang="en-US" sz="4000" dirty="0"/>
+              <a:t>(typically s=14). The nature of </a:t>
+            </a:r>
+            <a:r>
+              <a:rPr lang="el-GR" sz="4000" i="1" dirty="0">
+                <a:latin typeface="Cambria Math" panose="02040503050406030204" pitchFamily="18" charset="0"/>
+                <a:ea typeface="Cambria Math" panose="02040503050406030204" pitchFamily="18" charset="0"/>
+              </a:rPr>
+              <a:t>β</a:t>
+            </a:r>
+            <a:r>
+              <a:rPr lang="en-US" sz="4000" i="1" dirty="0">
+                <a:latin typeface="Cambria Math" panose="02040503050406030204" pitchFamily="18" charset="0"/>
+                <a:ea typeface="Cambria Math" panose="02040503050406030204" pitchFamily="18" charset="0"/>
+              </a:rPr>
+              <a:t> </a:t>
+            </a:r>
+            <a:r>
+              <a:rPr lang="en-US" sz="4000" dirty="0">
+                <a:latin typeface="Cambria Math" panose="02040503050406030204" pitchFamily="18" charset="0"/>
+                <a:ea typeface="Cambria Math" panose="02040503050406030204" pitchFamily="18" charset="0"/>
+              </a:rPr>
+              <a:t>is that in times high infections, the transmission rate will decrease after some delay and then rise back again when infections have decreased.</a:t>
+            </a:r>
+          </a:p>
+          <a:p>
+            <a:endParaRPr lang="en-US" sz="4000" dirty="0">
+              <a:latin typeface="Cambria Math" panose="02040503050406030204" pitchFamily="18" charset="0"/>
+              <a:ea typeface="Cambria Math" panose="02040503050406030204" pitchFamily="18" charset="0"/>
+            </a:endParaRPr>
+          </a:p>
+          <a:p>
+            <a:endParaRPr lang="en-US" sz="4000" dirty="0"/>
+          </a:p>
+          <a:p>
+            <a:r>
+              <a:rPr lang="en-US" sz="4000" b="1" dirty="0"/>
+              <a:t>Feedback SAIRD:</a:t>
             </a:r>
           </a:p>
         </p:txBody>
@@ -3520,8 +3695,98 @@
         </p:blipFill>
         <p:spPr>
           <a:xfrm>
-            <a:off x="22421381" y="4795301"/>
-            <a:ext cx="1805424" cy="2570870"/>
+            <a:off x="22895654" y="6159728"/>
+            <a:ext cx="1158899" cy="1650237"/>
+          </a:xfrm>
+          <a:prstGeom prst="rect">
+            <a:avLst/>
+          </a:prstGeom>
+        </p:spPr>
+      </p:pic>
+      <p:pic>
+        <p:nvPicPr>
+          <p:cNvPr id="7" name="Picture 6">
+            <a:extLst>
+              <a:ext uri="{FF2B5EF4-FFF2-40B4-BE49-F238E27FC236}">
+                <a16:creationId xmlns:a16="http://schemas.microsoft.com/office/drawing/2014/main" id="{AE5DD4C9-4FB9-44C1-855A-951BB15BEC42}"/>
+              </a:ext>
+            </a:extLst>
+          </p:cNvPr>
+          <p:cNvPicPr>
+            <a:picLocks/>
+          </p:cNvPicPr>
+          <p:nvPr/>
+        </p:nvPicPr>
+        <p:blipFill>
+          <a:blip r:embed="rId3"/>
+          <a:stretch>
+            <a:fillRect/>
+          </a:stretch>
+        </p:blipFill>
+        <p:spPr>
+          <a:xfrm>
+            <a:off x="19162437" y="18444184"/>
+            <a:ext cx="3543375" cy="646055"/>
+          </a:xfrm>
+          <a:prstGeom prst="rect">
+            <a:avLst/>
+          </a:prstGeom>
+        </p:spPr>
+      </p:pic>
+      <p:pic>
+        <p:nvPicPr>
+          <p:cNvPr id="10" name="Picture 9">
+            <a:extLst>
+              <a:ext uri="{FF2B5EF4-FFF2-40B4-BE49-F238E27FC236}">
+                <a16:creationId xmlns:a16="http://schemas.microsoft.com/office/drawing/2014/main" id="{24142CC9-C397-4D3E-AB7F-8FBB3FF7433E}"/>
+              </a:ext>
+            </a:extLst>
+          </p:cNvPr>
+          <p:cNvPicPr>
+            <a:picLocks/>
+          </p:cNvPicPr>
+          <p:nvPr/>
+        </p:nvPicPr>
+        <p:blipFill>
+          <a:blip r:embed="rId4"/>
+          <a:stretch>
+            <a:fillRect/>
+          </a:stretch>
+        </p:blipFill>
+        <p:spPr>
+          <a:xfrm>
+            <a:off x="23017501" y="10903397"/>
+            <a:ext cx="1144281" cy="2276125"/>
+          </a:xfrm>
+          <a:prstGeom prst="rect">
+            <a:avLst/>
+          </a:prstGeom>
+        </p:spPr>
+      </p:pic>
+      <p:pic>
+        <p:nvPicPr>
+          <p:cNvPr id="5" name="Picture 4">
+            <a:extLst>
+              <a:ext uri="{FF2B5EF4-FFF2-40B4-BE49-F238E27FC236}">
+                <a16:creationId xmlns:a16="http://schemas.microsoft.com/office/drawing/2014/main" id="{05F0B7D5-928B-4CB6-85C3-AF8C5B4714FF}"/>
+              </a:ext>
+            </a:extLst>
+          </p:cNvPr>
+          <p:cNvPicPr>
+            <a:picLocks/>
+          </p:cNvPicPr>
+          <p:nvPr/>
+        </p:nvPicPr>
+        <p:blipFill>
+          <a:blip r:embed="rId5"/>
+          <a:stretch>
+            <a:fillRect/>
+          </a:stretch>
+        </p:blipFill>
+        <p:spPr>
+          <a:xfrm>
+            <a:off x="4103533" y="23107947"/>
+            <a:ext cx="4609971" cy="1036692"/>
           </a:xfrm>
           <a:prstGeom prst="rect">
             <a:avLst/>
@@ -3543,15 +3808,15 @@
           <p:nvPr/>
         </p:nvPicPr>
         <p:blipFill>
-          <a:blip r:embed="rId3"/>
+          <a:blip r:embed="rId6"/>
           <a:stretch>
             <a:fillRect/>
           </a:stretch>
         </p:blipFill>
         <p:spPr>
           <a:xfrm>
-            <a:off x="20682064" y="8599931"/>
-            <a:ext cx="4066090" cy="3074361"/>
+            <a:off x="22248688" y="3760318"/>
+            <a:ext cx="2530791" cy="1913525"/>
           </a:xfrm>
           <a:prstGeom prst="rect">
             <a:avLst/>
@@ -3560,10 +3825,10 @@
       </p:pic>
       <p:pic>
         <p:nvPicPr>
-          <p:cNvPr id="5" name="Picture 4">
+          <p:cNvPr id="11" name="Picture 10">
             <a:extLst>
               <a:ext uri="{FF2B5EF4-FFF2-40B4-BE49-F238E27FC236}">
-                <a16:creationId xmlns:a16="http://schemas.microsoft.com/office/drawing/2014/main" id="{05F0B7D5-928B-4CB6-85C3-AF8C5B4714FF}"/>
+                <a16:creationId xmlns:a16="http://schemas.microsoft.com/office/drawing/2014/main" id="{DA7A0A3D-B8C7-4EDA-AB28-B4EED4937876}"/>
               </a:ext>
             </a:extLst>
           </p:cNvPr>
@@ -3573,51 +3838,59 @@
           <p:nvPr/>
         </p:nvPicPr>
         <p:blipFill>
-          <a:blip r:embed="rId4"/>
+          <a:blip r:embed="rId7"/>
           <a:stretch>
             <a:fillRect/>
           </a:stretch>
         </p:blipFill>
         <p:spPr>
           <a:xfrm>
-            <a:off x="4103533" y="23107947"/>
-            <a:ext cx="4609971" cy="1036692"/>
+            <a:off x="22933836" y="8272030"/>
+            <a:ext cx="1120717" cy="1988722"/>
           </a:xfrm>
           <a:prstGeom prst="rect">
             <a:avLst/>
           </a:prstGeom>
         </p:spPr>
       </p:pic>
-      <p:pic>
-        <p:nvPicPr>
-          <p:cNvPr id="7" name="Picture 6">
+      <p:cxnSp>
+        <p:nvCxnSpPr>
+          <p:cNvPr id="24" name="Straight Connector 23">
             <a:extLst>
               <a:ext uri="{FF2B5EF4-FFF2-40B4-BE49-F238E27FC236}">
-                <a16:creationId xmlns:a16="http://schemas.microsoft.com/office/drawing/2014/main" id="{AE5DD4C9-4FB9-44C1-855A-951BB15BEC42}"/>
+                <a16:creationId xmlns:a16="http://schemas.microsoft.com/office/drawing/2014/main" id="{645B5B54-4AB1-4666-A048-0FB2F6011275}"/>
               </a:ext>
             </a:extLst>
           </p:cNvPr>
-          <p:cNvPicPr>
-            <a:picLocks/>
-          </p:cNvPicPr>
+          <p:cNvCxnSpPr>
+            <a:cxnSpLocks/>
+          </p:cNvCxnSpPr>
           <p:nvPr/>
-        </p:nvPicPr>
-        <p:blipFill>
-          <a:blip r:embed="rId5"/>
-          <a:stretch>
-            <a:fillRect/>
-          </a:stretch>
-        </p:blipFill>
-        <p:spPr>
-          <a:xfrm>
-            <a:off x="15749177" y="13462634"/>
-            <a:ext cx="5769702" cy="1051975"/>
-          </a:xfrm>
-          <a:prstGeom prst="rect">
+        </p:nvCxnSpPr>
+        <p:spPr>
+          <a:xfrm flipV="1">
+            <a:off x="33921034" y="21359210"/>
+            <a:ext cx="0" cy="11559191"/>
+          </a:xfrm>
+          <a:prstGeom prst="line">
             <a:avLst/>
           </a:prstGeom>
         </p:spPr>
-      </p:pic>
+        <p:style>
+          <a:lnRef idx="1">
+            <a:schemeClr val="dk1"/>
+          </a:lnRef>
+          <a:fillRef idx="0">
+            <a:schemeClr val="dk1"/>
+          </a:fillRef>
+          <a:effectRef idx="0">
+            <a:schemeClr val="dk1"/>
+          </a:effectRef>
+          <a:fontRef idx="minor">
+            <a:schemeClr val="tx1"/>
+          </a:fontRef>
+        </p:style>
+      </p:cxnSp>
     </p:spTree>
     <p:extLst>
       <p:ext uri="{BB962C8B-B14F-4D97-AF65-F5344CB8AC3E}">
@@ -3894,7 +4167,7 @@
 
 <file path=ppt/webextensions/taskpanes.xml><?xml version="1.0" encoding="utf-8"?>
 <wetp:taskpanes xmlns:wetp="http://schemas.microsoft.com/office/webextensions/taskpanes/2010/11">
-  <wetp:taskpane dockstate="right" visibility="0" width="438" row="2">
+  <wetp:taskpane dockstate="right" visibility="0" width="350" row="1">
     <wetp:webextensionref xmlns:r="http://schemas.openxmlformats.org/officeDocument/2006/relationships" r:id="rId1"/>
   </wetp:taskpane>
 </wetp:taskpanes>
@@ -3907,8 +4180,8 @@
     <we:reference id="wa200002290" version="1.0.0.3" store="WA200002290" storeType="OMEX"/>
   </we:alternateReferences>
   <we:properties>
-    <we:property name="mathList" value="[{&quot;id&quot;:&quot;1&quot;,&quot;code&quot;:&quot;\\begin{gather*}\n{S+I{\\dmathop{\\longrightarrow}_{}^{\\beta}}I}\\\\\n{I{\\dmathop{\\longrightarrow}_{}^{\\gamma}}R}\\\\\n{I{\\dmathop{\\longrightarrow}_{}^{\\nu}}D}\t\n\\end{gather*}&quot;,&quot;font&quot;:{&quot;size&quot;:12,&quot;family&quot;:&quot;Arial&quot;,&quot;color&quot;:&quot;black&quot;},&quot;type&quot;:&quot;gather*&quot;},{&quot;id&quot;:&quot;2&quot;,&quot;code&quot;:&quot;\\begin{align*}\n{\\dot{S}}&amp;={-\\beta\\frac{SI}{S+I}}\\\\\n{\\dot{I}}&amp;={\\beta\\frac{SI}{S+I}-\\gamma I-\\nu I}\\\\\n{\\dot{R}}&amp;={\\gamma I}\\\\\n{\\dot{D}}&amp;={\\nu I}\t\n\\end{align*}&quot;,&quot;font&quot;:{&quot;size&quot;:12,&quot;family&quot;:&quot;Arial&quot;,&quot;color&quot;:&quot;black&quot;},&quot;type&quot;:&quot;align*&quot;},{&quot;id&quot;:&quot;3&quot;,&quot;code&quot;:&quot;\\begin{align*}\n{R\\left(t\\right)}&amp;={I\\left(t-14\\right)-D\\left(t\\right)}\\\\\n{A\\left(t\\right)}&amp;={I\\left(t+s\\right)}\t\n\\end{align*}&quot;,&quot;font&quot;:{&quot;size&quot;:12,&quot;family&quot;:&quot;Arial&quot;,&quot;color&quot;:&quot;black&quot;},&quot;type&quot;:&quot;align*&quot;},{&quot;id&quot;:&quot;4&quot;,&quot;code&quot;:&quot;$\\beta=b_{0}+\\frac{b_{1}}{1+\\left(b_{2}\\cdot I\\left(t-s\\right)\\right)^{b_{3}}}$&quot;,&quot;font&quot;:{&quot;size&quot;:12,&quot;family&quot;:&quot;Arial&quot;,&quot;color&quot;:&quot;black&quot;},&quot;type&quot;:&quot;$&quot;}]"/>
-    <we:property name="nextMathId" value="&quot;5&quot;"/>
+    <we:property name="mathList" value="[{&quot;id&quot;:&quot;3&quot;,&quot;code&quot;:&quot;\\begin{align*}\n{R\\left(t\\right)}&amp;={I\\left(t-14\\right)-D\\left(t\\right)}\\\\\n{A\\left(t\\right)}&amp;={I\\left(t+s\\right)}\t\n\\end{align*}&quot;,&quot;font&quot;:{&quot;size&quot;:12,&quot;family&quot;:&quot;Arial&quot;,&quot;color&quot;:&quot;black&quot;},&quot;type&quot;:&quot;align*&quot;},{&quot;id&quot;:&quot;4&quot;,&quot;code&quot;:&quot;$\\beta=b_{0}+\\frac{b_{1}}{1+\\left(b_{2}\\cdot I\\left(t-s\\right)\\right)^{b_{3}}}$&quot;,&quot;font&quot;:{&quot;size&quot;:12,&quot;family&quot;:&quot;Arial&quot;,&quot;color&quot;:&quot;black&quot;},&quot;type&quot;:&quot;$&quot;},{&quot;id&quot;:&quot;5&quot;,&quot;code&quot;:&quot;\\begin{gather*}\n{S+A{\\dmathop{\\longrightarrow}_{}^{\\beta}}A}\\\\\n{A{\\dmathop{\\longrightarrow}_{}^{\\kappa}}I}\\\\\n{I{\\dmathop{\\longrightarrow}_{}^{\\gamma}}R}\\\\\n{I{\\dmathop{\\longrightarrow}_{}^{\\nu}}R}\t\n\\end{gather*}&quot;,&quot;font&quot;:{&quot;size&quot;:12,&quot;family&quot;:&quot;Arial&quot;,&quot;color&quot;:&quot;black&quot;},&quot;type&quot;:&quot;gather*&quot;},{&quot;id&quot;:&quot;6&quot;,&quot;code&quot;:&quot;\\begin{gather*}\n{S+I{\\dmathop{\\longrightarrow}_{}^{\\beta}}I}\\\\\n{I{\\dmathop{\\longrightarrow}_{}^{\\gamma}}R}\\\\\n{I{\\dmathop{\\longrightarrow}_{}^{\\nu}}D}\\\\\n{S\\longrightarrow V}\\\\\n{R\\longrightarrow V}\t\n\\end{gather*}&quot;,&quot;font&quot;:{&quot;size&quot;:12,&quot;family&quot;:&quot;Arial&quot;,&quot;color&quot;:&quot;black&quot;},&quot;type&quot;:&quot;gather*&quot;},{&quot;id&quot;:&quot;7&quot;,&quot;code&quot;:&quot;\\begin{gather*}\n{S+A{\\dmathop{\\longrightarrow}_{}^{\\beta}}A}\\\\\n{A{\\dmathop{\\longrightarrow}_{}^{\\kappa}}I}\\\\\n{I{\\dmathop{\\longrightarrow R}_{}^{\\gamma}}}\\\\\n{I{\\dmathop{\\longrightarrow D}_{}^{\\nu}}}\t\n\\end{gather*}&quot;,&quot;font&quot;:{&quot;size&quot;:12,&quot;family&quot;:&quot;Arial&quot;,&quot;color&quot;:&quot;black&quot;},&quot;type&quot;:&quot;gather*&quot;}]"/>
+    <we:property name="nextMathId" value="&quot;8&quot;"/>
     <we:property name="sidebarState" value="&quot;[false,true,false,true]&quot;"/>
   </we:properties>
   <we:bindings/>

</xml_diff>

<commit_message>
figures generated some poster additions
</commit_message>
<xml_diff>
--- a/Posters/Using Feedback and Vaccination Data to More Accurately Model and Predict the SARS-CoV-2 Pandemic.pptx
+++ b/Posters/Using Feedback and Vaccination Data to More Accurately Model and Predict the SARS-CoV-2 Pandemic.pptx
@@ -3222,8 +3222,8 @@
         </p:nvSpPr>
         <p:spPr>
           <a:xfrm>
-            <a:off x="465543" y="15357618"/>
-            <a:ext cx="11885949" cy="8787021"/>
+            <a:off x="266694" y="15357618"/>
+            <a:ext cx="12283647" cy="8171468"/>
           </a:xfrm>
           <a:prstGeom prst="rect">
             <a:avLst/>
@@ -3245,7 +3245,15 @@
           <a:p>
             <a:r>
               <a:rPr lang="en-US" sz="4000" dirty="0"/>
-              <a:t>Due to the nature of the data, not all infections, recoveries, and deaths are recorded. Therefore, a scaling factor to I, R, D must be used to properly model these populations. This value, q, is solved by gridding values and minimizing an objective function.</a:t>
+              <a:t>Due to the nature of the data, not </a:t>
+            </a:r>
+            <a:r>
+              <a:rPr lang="en-US" sz="4000"/>
+              <a:t>all infections, </a:t>
+            </a:r>
+            <a:r>
+              <a:rPr lang="en-US" sz="4000" dirty="0"/>
+              <a:t>recoveries, and deaths are recorded. Therefore, a scaling factor to I, R, D must be used to properly model these populations. This value, q, is solved by gridding values and minimizing an objective function</a:t>
             </a:r>
           </a:p>
           <a:p>
@@ -3360,7 +3368,7 @@
         <p:spPr>
           <a:xfrm>
             <a:off x="25066160" y="3753950"/>
-            <a:ext cx="18558346" cy="10018127"/>
+            <a:ext cx="18558346" cy="16173658"/>
           </a:xfrm>
           <a:prstGeom prst="rect">
             <a:avLst/>
@@ -3382,7 +3390,7 @@
           <a:p>
             <a:r>
               <a:rPr lang="en-US" sz="4000" dirty="0"/>
-              <a:t>Modeling Transmission Rate in Italy and California:</a:t>
+              <a:t>Modeling Transmission Rate in Italy and California: (graph over time, constant, and feedback)</a:t>
             </a:r>
           </a:p>
           <a:p>
@@ -3397,7 +3405,7 @@
           <a:p>
             <a:r>
               <a:rPr lang="en-US" sz="4000" dirty="0"/>
-              <a:t>Predicting first wave decline:</a:t>
+              <a:t>Predicting first wave decline: (all models should do moderately well here)</a:t>
             </a:r>
           </a:p>
           <a:p>
@@ -3407,9 +3415,29 @@
             <a:endParaRPr lang="en-US" sz="4000" dirty="0"/>
           </a:p>
           <a:p>
+            <a:endParaRPr lang="en-US" sz="4000" dirty="0"/>
+          </a:p>
+          <a:p>
+            <a:endParaRPr lang="en-US" sz="4000" dirty="0"/>
+          </a:p>
+          <a:p>
+            <a:endParaRPr lang="en-US" sz="4000" dirty="0"/>
+          </a:p>
+          <a:p>
+            <a:endParaRPr lang="en-US" sz="4000" dirty="0"/>
+          </a:p>
+          <a:p>
             <a:r>
               <a:rPr lang="en-US" sz="4000" dirty="0"/>
-              <a:t>Predicting first wave:</a:t>
+              <a:t>Predicting first wave: (</a:t>
+            </a:r>
+            <a:r>
+              <a:rPr lang="en-US" sz="4000" dirty="0" err="1"/>
+              <a:t>sird</a:t>
+            </a:r>
+            <a:r>
+              <a:rPr lang="en-US" sz="4000" dirty="0"/>
+              <a:t> should spike wildly, feedback should model somewhat well)</a:t>
             </a:r>
           </a:p>
           <a:p>
@@ -3419,10 +3447,33 @@
             <a:endParaRPr lang="en-US" sz="4000" dirty="0"/>
           </a:p>
           <a:p>
+            <a:endParaRPr lang="en-US" sz="4000" dirty="0"/>
+          </a:p>
+          <a:p>
+            <a:endParaRPr lang="en-US" sz="4000" dirty="0"/>
+          </a:p>
+          <a:p>
+            <a:endParaRPr lang="en-US" sz="4000" dirty="0"/>
+          </a:p>
+          <a:p>
+            <a:endParaRPr lang="en-US" sz="4000" dirty="0"/>
+          </a:p>
+          <a:p>
             <a:r>
               <a:rPr lang="en-US" sz="4000" dirty="0"/>
-              <a:t>Predicting late-stage wave:</a:t>
-            </a:r>
+              <a:t>Predicting late-stage wave: (</a:t>
+            </a:r>
+            <a:r>
+              <a:rPr lang="en-US" sz="4000" dirty="0" err="1"/>
+              <a:t>sird</a:t>
+            </a:r>
+            <a:r>
+              <a:rPr lang="en-US" sz="4000" dirty="0"/>
+              <a:t> should spike, feedback should model somewhat well)</a:t>
+            </a:r>
+          </a:p>
+          <a:p>
+            <a:endParaRPr lang="en-US" sz="4000" dirty="0"/>
           </a:p>
           <a:p>
             <a:endParaRPr lang="en-US" sz="4000" dirty="0"/>
@@ -3524,8 +3575,8 @@
         </p:nvSpPr>
         <p:spPr>
           <a:xfrm>
-            <a:off x="12922373" y="3559125"/>
-            <a:ext cx="12049676" cy="16173658"/>
+            <a:off x="12922372" y="3559125"/>
+            <a:ext cx="10257786" cy="17943374"/>
           </a:xfrm>
           <a:prstGeom prst="rect">
             <a:avLst/>
@@ -3538,53 +3589,16 @@
           </a:bodyPr>
           <a:lstStyle/>
           <a:p>
-            <a:pPr algn="ctr"/>
-            <a:r>
-              <a:rPr lang="en-US" sz="4500" b="1" dirty="0"/>
-              <a:t>Models</a:t>
-            </a:r>
-          </a:p>
-          <a:p>
-            <a:r>
-              <a:rPr lang="en-US" sz="4000" b="1" dirty="0"/>
-              <a:t>SIRD:</a:t>
-            </a:r>
-          </a:p>
-          <a:p>
-            <a:r>
-              <a:rPr lang="en-US" sz="4000" dirty="0"/>
-              <a:t>The SIRD model </a:t>
-            </a:r>
-          </a:p>
-          <a:p>
-            <a:r>
-              <a:rPr lang="en-US" sz="4000" dirty="0"/>
-              <a:t>--</a:t>
-            </a:r>
-          </a:p>
-          <a:p>
-            <a:r>
-              <a:rPr lang="en-US" sz="4000" dirty="0"/>
-              <a:t> </a:t>
-            </a:r>
-          </a:p>
-          <a:p>
-            <a:endParaRPr lang="en-US" sz="4000" dirty="0"/>
-          </a:p>
-          <a:p>
-            <a:endParaRPr lang="en-US" sz="4000" dirty="0"/>
-          </a:p>
-          <a:p>
             <a:r>
               <a:rPr lang="en-US" sz="4000" b="1" dirty="0"/>
               <a:t>SAIRD:</a:t>
             </a:r>
           </a:p>
           <a:p>
-            <a:endParaRPr lang="en-US" sz="4000" dirty="0"/>
-          </a:p>
-          <a:p>
-            <a:endParaRPr lang="en-US" sz="4000" dirty="0"/>
+            <a:r>
+              <a:rPr lang="en-US" sz="4000" dirty="0"/>
+              <a:t>The SAIRD model is similar to the SIRD model but introduces an asymptomatic population (see methods/approach for asymptomatic approximation). The population interactions can be seen on the right.</a:t>
+            </a:r>
           </a:p>
           <a:p>
             <a:endParaRPr lang="en-US" sz="4000" dirty="0"/>
@@ -3596,10 +3610,10 @@
             </a:r>
           </a:p>
           <a:p>
-            <a:endParaRPr lang="en-US" sz="4000" dirty="0"/>
-          </a:p>
-          <a:p>
-            <a:endParaRPr lang="en-US" sz="4000" dirty="0"/>
+            <a:r>
+              <a:rPr lang="en-US" sz="4000" dirty="0"/>
+              <a:t>The SIRD+V model introduces a vaccinated population group. This model assumes that susceptible and recovered individuals will exit at the same rate into the vaccination rate. </a:t>
+            </a:r>
           </a:p>
           <a:p>
             <a:endParaRPr lang="en-US" sz="4000" dirty="0"/>
@@ -3624,7 +3638,7 @@
             </a:r>
             <a:r>
               <a:rPr lang="en-US" sz="4000" dirty="0"/>
-              <a:t>. Beta is replaced with a time varying function depending on the current infections with a shift, </a:t>
+              <a:t>. Beta is replaced with a time varying function depending on the current infections with a delay, </a:t>
             </a:r>
             <a:r>
               <a:rPr lang="en-US" sz="4000" i="1" dirty="0"/>
@@ -3653,14 +3667,8 @@
                 <a:latin typeface="Cambria Math" panose="02040503050406030204" pitchFamily="18" charset="0"/>
                 <a:ea typeface="Cambria Math" panose="02040503050406030204" pitchFamily="18" charset="0"/>
               </a:rPr>
-              <a:t>is that in times high infections, the transmission rate will decrease after some delay and then rise back again when infections have decreased.</a:t>
-            </a:r>
-          </a:p>
-          <a:p>
-            <a:endParaRPr lang="en-US" sz="4000" dirty="0">
-              <a:latin typeface="Cambria Math" panose="02040503050406030204" pitchFamily="18" charset="0"/>
-              <a:ea typeface="Cambria Math" panose="02040503050406030204" pitchFamily="18" charset="0"/>
-            </a:endParaRPr>
+              <a:t>is that in times of high infections, the transmission rate will decrease after some delay and then rise back again when infections have decreased.</a:t>
+            </a:r>
           </a:p>
           <a:p>
             <a:endParaRPr lang="en-US" sz="4000" dirty="0"/>
@@ -3669,6 +3677,12 @@
             <a:r>
               <a:rPr lang="en-US" sz="4000" b="1" dirty="0"/>
               <a:t>Feedback SAIRD:</a:t>
+            </a:r>
+          </a:p>
+          <a:p>
+            <a:r>
+              <a:rPr lang="en-US" sz="4000" dirty="0"/>
+              <a:t>The SAIRD feedback introduces the same model additions to the SAIRD model as the SIRD feedback does to the SIRD model, with the exception that the delay is modeled inherently by the asymptomatic to infected interaction.</a:t>
             </a:r>
           </a:p>
         </p:txBody>
@@ -3695,8 +3709,8 @@
         </p:blipFill>
         <p:spPr>
           <a:xfrm>
-            <a:off x="22895654" y="6159728"/>
-            <a:ext cx="1158899" cy="1650237"/>
+            <a:off x="10048836" y="25579908"/>
+            <a:ext cx="1900278" cy="2705938"/>
           </a:xfrm>
           <a:prstGeom prst="rect">
             <a:avLst/>
@@ -3725,8 +3739,8 @@
         </p:blipFill>
         <p:spPr>
           <a:xfrm>
-            <a:off x="19162437" y="18444184"/>
-            <a:ext cx="3543375" cy="646055"/>
+            <a:off x="20642335" y="17218294"/>
+            <a:ext cx="3792170" cy="691417"/>
           </a:xfrm>
           <a:prstGeom prst="rect">
             <a:avLst/>
@@ -3755,8 +3769,8 @@
         </p:blipFill>
         <p:spPr>
           <a:xfrm>
-            <a:off x="23017501" y="10903397"/>
-            <a:ext cx="1144281" cy="2276125"/>
+            <a:off x="23180159" y="8421410"/>
+            <a:ext cx="1451299" cy="2886824"/>
           </a:xfrm>
           <a:prstGeom prst="rect">
             <a:avLst/>
@@ -3815,8 +3829,8 @@
         </p:blipFill>
         <p:spPr>
           <a:xfrm>
-            <a:off x="22248688" y="3760318"/>
-            <a:ext cx="2530791" cy="1913525"/>
+            <a:off x="8971522" y="29494323"/>
+            <a:ext cx="3578819" cy="2705937"/>
           </a:xfrm>
           <a:prstGeom prst="rect">
             <a:avLst/>
@@ -3845,8 +3859,8 @@
         </p:blipFill>
         <p:spPr>
           <a:xfrm>
-            <a:off x="22933836" y="8272030"/>
-            <a:ext cx="1120717" cy="1988722"/>
+            <a:off x="23009519" y="4028453"/>
+            <a:ext cx="1658825" cy="2943599"/>
           </a:xfrm>
           <a:prstGeom prst="rect">
             <a:avLst/>
@@ -3891,6 +3905,54 @@
           </a:fontRef>
         </p:style>
       </p:cxnSp>
+      <p:sp>
+        <p:nvSpPr>
+          <p:cNvPr id="25" name="TextBox 24">
+            <a:extLst>
+              <a:ext uri="{FF2B5EF4-FFF2-40B4-BE49-F238E27FC236}">
+                <a16:creationId xmlns:a16="http://schemas.microsoft.com/office/drawing/2014/main" id="{E2FF5FB5-A3D1-4E10-B872-7C24925D0A45}"/>
+              </a:ext>
+            </a:extLst>
+          </p:cNvPr>
+          <p:cNvSpPr txBox="1"/>
+          <p:nvPr/>
+        </p:nvSpPr>
+        <p:spPr>
+          <a:xfrm>
+            <a:off x="266694" y="24348802"/>
+            <a:ext cx="8865977" cy="6324808"/>
+          </a:xfrm>
+          <a:prstGeom prst="rect">
+            <a:avLst/>
+          </a:prstGeom>
+          <a:noFill/>
+        </p:spPr>
+        <p:txBody>
+          <a:bodyPr wrap="square">
+            <a:spAutoFit/>
+          </a:bodyPr>
+          <a:lstStyle/>
+          <a:p>
+            <a:pPr algn="ctr"/>
+            <a:r>
+              <a:rPr lang="en-US" sz="4500" b="1" dirty="0"/>
+              <a:t>						Models</a:t>
+            </a:r>
+          </a:p>
+          <a:p>
+            <a:r>
+              <a:rPr lang="en-US" sz="4000" b="1" dirty="0"/>
+              <a:t>SIRD:</a:t>
+            </a:r>
+          </a:p>
+          <a:p>
+            <a:r>
+              <a:rPr lang="en-US" sz="4000" dirty="0"/>
+              <a:t>The SIRD model is among the simplest of disease models. The model interactions can be seen to the right and the exact equations for the daily change in each population below this. The transmission rate, recovery rate, and death rate can be solved for using least squares regression and are approximated as constants.</a:t>
+            </a:r>
+          </a:p>
+        </p:txBody>
+      </p:sp>
     </p:spTree>
     <p:extLst>
       <p:ext uri="{BB962C8B-B14F-4D97-AF65-F5344CB8AC3E}">

</xml_diff>

<commit_message>
forgot to push the powerpoint change
</commit_message>
<xml_diff>
--- a/Posters/Using Feedback and Vaccination Data to More Accurately Model and Predict the SARS-CoV-2 Pandemic.pptx
+++ b/Posters/Using Feedback and Vaccination Data to More Accurately Model and Predict the SARS-CoV-2 Pandemic.pptx
@@ -3245,15 +3245,7 @@
           <a:p>
             <a:r>
               <a:rPr lang="en-US" sz="4000" dirty="0"/>
-              <a:t>Due to the nature of the data, not </a:t>
-            </a:r>
-            <a:r>
-              <a:rPr lang="en-US" sz="4000"/>
-              <a:t>all infections, </a:t>
-            </a:r>
-            <a:r>
-              <a:rPr lang="en-US" sz="4000" dirty="0"/>
-              <a:t>recoveries, and deaths are recorded. Therefore, a scaling factor to I, R, D must be used to properly model these populations. This value, q, is solved by gridding values and minimizing an objective function</a:t>
+              <a:t>Due to the nature of the data, not all infections, recoveries, and deaths are recorded. Therefore, a scaling factor to I, R, D must be used to properly model these populations. This value, q, is solved by gridding values and minimizing an objective function</a:t>
             </a:r>
           </a:p>
           <a:p>
@@ -3368,7 +3360,7 @@
         <p:spPr>
           <a:xfrm>
             <a:off x="25066160" y="3753950"/>
-            <a:ext cx="18558346" cy="16173658"/>
+            <a:ext cx="18558346" cy="18635871"/>
           </a:xfrm>
           <a:prstGeom prst="rect">
             <a:avLst/>
@@ -3392,6 +3384,18 @@
               <a:rPr lang="en-US" sz="4000" dirty="0"/>
               <a:t>Modeling Transmission Rate in Italy and California: (graph over time, constant, and feedback)</a:t>
             </a:r>
+          </a:p>
+          <a:p>
+            <a:endParaRPr lang="en-US" sz="4000" dirty="0"/>
+          </a:p>
+          <a:p>
+            <a:endParaRPr lang="en-US" sz="4000" dirty="0"/>
+          </a:p>
+          <a:p>
+            <a:endParaRPr lang="en-US" sz="4000" dirty="0"/>
+          </a:p>
+          <a:p>
+            <a:endParaRPr lang="en-US" sz="4000" dirty="0"/>
           </a:p>
           <a:p>
             <a:endParaRPr lang="en-US" sz="4000" dirty="0"/>
@@ -3709,8 +3713,8 @@
         </p:blipFill>
         <p:spPr>
           <a:xfrm>
-            <a:off x="10048836" y="25579908"/>
-            <a:ext cx="1900278" cy="2705938"/>
+            <a:off x="9447605" y="25621391"/>
+            <a:ext cx="2501503" cy="3562064"/>
           </a:xfrm>
           <a:prstGeom prst="rect">
             <a:avLst/>
@@ -3739,8 +3743,8 @@
         </p:blipFill>
         <p:spPr>
           <a:xfrm>
-            <a:off x="20642335" y="17218294"/>
-            <a:ext cx="3792170" cy="691417"/>
+            <a:off x="19007297" y="17109120"/>
+            <a:ext cx="5704706" cy="1040125"/>
           </a:xfrm>
           <a:prstGeom prst="rect">
             <a:avLst/>
@@ -3769,8 +3773,8 @@
         </p:blipFill>
         <p:spPr>
           <a:xfrm>
-            <a:off x="23180159" y="8421410"/>
-            <a:ext cx="1451299" cy="2886824"/>
+            <a:off x="23027767" y="8421405"/>
+            <a:ext cx="1723458" cy="3428183"/>
           </a:xfrm>
           <a:prstGeom prst="rect">
             <a:avLst/>
@@ -3799,8 +3803,8 @@
         </p:blipFill>
         <p:spPr>
           <a:xfrm>
-            <a:off x="4103533" y="23107947"/>
-            <a:ext cx="4609971" cy="1036692"/>
+            <a:off x="3468093" y="22616457"/>
+            <a:ext cx="5880847" cy="1322487"/>
           </a:xfrm>
           <a:prstGeom prst="rect">
             <a:avLst/>
@@ -3829,8 +3833,8 @@
         </p:blipFill>
         <p:spPr>
           <a:xfrm>
-            <a:off x="8971522" y="29494323"/>
-            <a:ext cx="3578819" cy="2705937"/>
+            <a:off x="8534847" y="29727191"/>
+            <a:ext cx="4114164" cy="3110710"/>
           </a:xfrm>
           <a:prstGeom prst="rect">
             <a:avLst/>
@@ -3859,8 +3863,8 @@
         </p:blipFill>
         <p:spPr>
           <a:xfrm>
-            <a:off x="23009519" y="4028453"/>
-            <a:ext cx="1658825" cy="2943599"/>
+            <a:off x="22946033" y="3931777"/>
+            <a:ext cx="1931908" cy="3428187"/>
           </a:xfrm>
           <a:prstGeom prst="rect">
             <a:avLst/>
@@ -3953,6 +3957,111 @@
           </a:p>
         </p:txBody>
       </p:sp>
+      <p:pic>
+        <p:nvPicPr>
+          <p:cNvPr id="26" name="Picture 25" descr="Chart, line chart&#10;&#10;Description automatically generated">
+            <a:extLst>
+              <a:ext uri="{FF2B5EF4-FFF2-40B4-BE49-F238E27FC236}">
+                <a16:creationId xmlns:a16="http://schemas.microsoft.com/office/drawing/2014/main" id="{C8F193D8-1B4F-4612-AF62-26A5D5A7638F}"/>
+              </a:ext>
+            </a:extLst>
+          </p:cNvPr>
+          <p:cNvPicPr>
+            <a:picLocks noChangeAspect="1"/>
+          </p:cNvPicPr>
+          <p:nvPr/>
+        </p:nvPicPr>
+        <p:blipFill rotWithShape="1">
+          <a:blip r:embed="rId8">
+            <a:extLst>
+              <a:ext uri="{28A0092B-C50C-407E-A947-70E740481C1C}">
+                <a14:useLocalDpi xmlns:a14="http://schemas.microsoft.com/office/drawing/2010/main" val="0"/>
+              </a:ext>
+            </a:extLst>
+          </a:blip>
+          <a:srcRect l="3283" t="122" r="9310" b="-122"/>
+          <a:stretch/>
+        </p:blipFill>
+        <p:spPr>
+          <a:xfrm>
+            <a:off x="31529317" y="5815883"/>
+            <a:ext cx="5915060" cy="3352782"/>
+          </a:xfrm>
+          <a:prstGeom prst="rect">
+            <a:avLst/>
+          </a:prstGeom>
+        </p:spPr>
+      </p:pic>
+      <p:pic>
+        <p:nvPicPr>
+          <p:cNvPr id="28" name="Picture 27" descr="Chart, histogram&#10;&#10;Description automatically generated">
+            <a:extLst>
+              <a:ext uri="{FF2B5EF4-FFF2-40B4-BE49-F238E27FC236}">
+                <a16:creationId xmlns:a16="http://schemas.microsoft.com/office/drawing/2014/main" id="{FF5384F8-00F3-44D2-B473-814214BF267E}"/>
+              </a:ext>
+            </a:extLst>
+          </p:cNvPr>
+          <p:cNvPicPr>
+            <a:picLocks noChangeAspect="1"/>
+          </p:cNvPicPr>
+          <p:nvPr/>
+        </p:nvPicPr>
+        <p:blipFill rotWithShape="1">
+          <a:blip r:embed="rId9">
+            <a:extLst>
+              <a:ext uri="{28A0092B-C50C-407E-A947-70E740481C1C}">
+                <a14:useLocalDpi xmlns:a14="http://schemas.microsoft.com/office/drawing/2010/main" val="0"/>
+              </a:ext>
+            </a:extLst>
+          </a:blip>
+          <a:srcRect l="4307" r="8286"/>
+          <a:stretch/>
+        </p:blipFill>
+        <p:spPr>
+          <a:xfrm>
+            <a:off x="37709446" y="5815883"/>
+            <a:ext cx="5915060" cy="3352782"/>
+          </a:xfrm>
+          <a:prstGeom prst="rect">
+            <a:avLst/>
+          </a:prstGeom>
+        </p:spPr>
+      </p:pic>
+      <p:pic>
+        <p:nvPicPr>
+          <p:cNvPr id="30" name="Picture 29" descr="Chart, histogram&#10;&#10;Description automatically generated">
+            <a:extLst>
+              <a:ext uri="{FF2B5EF4-FFF2-40B4-BE49-F238E27FC236}">
+                <a16:creationId xmlns:a16="http://schemas.microsoft.com/office/drawing/2014/main" id="{29A8971C-27A9-418F-9CAE-18B0A7EB2A2C}"/>
+              </a:ext>
+            </a:extLst>
+          </p:cNvPr>
+          <p:cNvPicPr>
+            <a:picLocks noChangeAspect="1"/>
+          </p:cNvPicPr>
+          <p:nvPr/>
+        </p:nvPicPr>
+        <p:blipFill rotWithShape="1">
+          <a:blip r:embed="rId10">
+            <a:extLst>
+              <a:ext uri="{28A0092B-C50C-407E-A947-70E740481C1C}">
+                <a14:useLocalDpi xmlns:a14="http://schemas.microsoft.com/office/drawing/2010/main" val="0"/>
+              </a:ext>
+            </a:extLst>
+          </a:blip>
+          <a:srcRect l="4039" r="8554"/>
+          <a:stretch/>
+        </p:blipFill>
+        <p:spPr>
+          <a:xfrm>
+            <a:off x="25349188" y="5815883"/>
+            <a:ext cx="5915060" cy="3352781"/>
+          </a:xfrm>
+          <a:prstGeom prst="rect">
+            <a:avLst/>
+          </a:prstGeom>
+        </p:spPr>
+      </p:pic>
     </p:spTree>
     <p:extLst>
       <p:ext uri="{BB962C8B-B14F-4D97-AF65-F5344CB8AC3E}">

</xml_diff>